<commit_message>
add the finished impress.js
</commit_message>
<xml_diff>
--- a/presentation/SPA_workshop.pptx
+++ b/presentation/SPA_workshop.pptx
@@ -179,6 +179,256 @@
           <c:idx val="0"/>
           <c:order val="0"/>
           <c:dLbls>
+            <c:dLbl>
+              <c:idx val="1"/>
+              <c:layout/>
+              <c:tx>
+                <c:rich>
+                  <a:bodyPr/>
+                  <a:lstStyle/>
+                  <a:p>
+                    <a:r>
+                      <a:rPr lang="en-US" b="1" dirty="0" err="1">
+                        <a:solidFill>
+                          <a:schemeClr val="bg1"/>
+                        </a:solidFill>
+                      </a:rPr>
+                      <a:t>AngularJS</a:t>
+                    </a:r>
+                    <a:r>
+                      <a:rPr lang="en-US" b="1" dirty="0">
+                        <a:solidFill>
+                          <a:schemeClr val="bg1"/>
+                        </a:solidFill>
+                      </a:rPr>
+                      <a:t>
+25%</a:t>
+                    </a:r>
+                  </a:p>
+                </c:rich>
+              </c:tx>
+              <c:dLblPos val="bestFit"/>
+              <c:showLegendKey val="0"/>
+              <c:showVal val="0"/>
+              <c:showCatName val="1"/>
+              <c:showSerName val="0"/>
+              <c:showPercent val="1"/>
+              <c:showBubbleSize val="0"/>
+            </c:dLbl>
+            <c:dLbl>
+              <c:idx val="2"/>
+              <c:layout/>
+              <c:tx>
+                <c:rich>
+                  <a:bodyPr/>
+                  <a:lstStyle/>
+                  <a:p>
+                    <a:pPr algn="ctr" rtl="0">
+                      <a:defRPr lang="en-US" sz="1000" b="1" i="0" u="none" strike="noStrike" kern="1200" baseline="0" dirty="0">
+                        <a:solidFill>
+                          <a:schemeClr val="bg1"/>
+                        </a:solidFill>
+                        <a:latin typeface="+mn-lt"/>
+                        <a:ea typeface="+mn-ea"/>
+                        <a:cs typeface="+mn-cs"/>
+                      </a:defRPr>
+                    </a:pPr>
+                    <a:r>
+                      <a:rPr lang="en-US" sz="1000" b="1" i="0" u="none" strike="noStrike" kern="1200" baseline="0" dirty="0">
+                        <a:solidFill>
+                          <a:schemeClr val="bg1"/>
+                        </a:solidFill>
+                        <a:latin typeface="+mn-lt"/>
+                        <a:ea typeface="+mn-ea"/>
+                        <a:cs typeface="+mn-cs"/>
+                      </a:rPr>
+                      <a:t>Backbone.js
+25%</a:t>
+                    </a:r>
+                  </a:p>
+                </c:rich>
+              </c:tx>
+              <c:spPr/>
+              <c:dLblPos val="bestFit"/>
+              <c:showLegendKey val="0"/>
+              <c:showVal val="0"/>
+              <c:showCatName val="1"/>
+              <c:showSerName val="0"/>
+              <c:showPercent val="1"/>
+              <c:showBubbleSize val="0"/>
+            </c:dLbl>
+            <c:dLbl>
+              <c:idx val="6"/>
+              <c:layout/>
+              <c:tx>
+                <c:rich>
+                  <a:bodyPr/>
+                  <a:lstStyle/>
+                  <a:p>
+                    <a:pPr>
+                      <a:defRPr>
+                        <a:solidFill>
+                          <a:schemeClr val="bg1"/>
+                        </a:solidFill>
+                      </a:defRPr>
+                    </a:pPr>
+                    <a:r>
+                      <a:rPr lang="en-US" b="1" dirty="0"/>
+                      <a:t>Ember
+5%</a:t>
+                    </a:r>
+                  </a:p>
+                </c:rich>
+              </c:tx>
+              <c:spPr/>
+              <c:dLblPos val="bestFit"/>
+              <c:showLegendKey val="0"/>
+              <c:showVal val="0"/>
+              <c:showCatName val="1"/>
+              <c:showSerName val="0"/>
+              <c:showPercent val="1"/>
+              <c:showBubbleSize val="0"/>
+            </c:dLbl>
+            <c:dLbl>
+              <c:idx val="7"/>
+              <c:spPr/>
+              <c:txPr>
+                <a:bodyPr/>
+                <a:lstStyle/>
+                <a:p>
+                  <a:pPr algn="ctr" rtl="0">
+                    <a:defRPr lang="en-US" sz="1000" b="1" i="0" u="none" strike="noStrike" kern="1200" baseline="0">
+                      <a:solidFill>
+                        <a:schemeClr val="bg1"/>
+                      </a:solidFill>
+                      <a:latin typeface="+mn-lt"/>
+                      <a:ea typeface="+mn-ea"/>
+                      <a:cs typeface="+mn-cs"/>
+                    </a:defRPr>
+                  </a:pPr>
+                  <a:endParaRPr lang="en-US"/>
+                </a:p>
+              </c:txPr>
+              <c:dLblPos val="bestFit"/>
+              <c:showLegendKey val="0"/>
+              <c:showVal val="0"/>
+              <c:showCatName val="1"/>
+              <c:showSerName val="0"/>
+              <c:showPercent val="1"/>
+              <c:showBubbleSize val="0"/>
+            </c:dLbl>
+            <c:dLbl>
+              <c:idx val="10"/>
+              <c:spPr/>
+              <c:txPr>
+                <a:bodyPr/>
+                <a:lstStyle/>
+                <a:p>
+                  <a:pPr algn="ctr" rtl="0">
+                    <a:defRPr lang="en-US" sz="1000" b="1" i="0" u="none" strike="noStrike" kern="1200" baseline="0">
+                      <a:solidFill>
+                        <a:schemeClr val="bg1"/>
+                      </a:solidFill>
+                      <a:latin typeface="+mn-lt"/>
+                      <a:ea typeface="+mn-ea"/>
+                      <a:cs typeface="+mn-cs"/>
+                    </a:defRPr>
+                  </a:pPr>
+                  <a:endParaRPr lang="en-US"/>
+                </a:p>
+              </c:txPr>
+              <c:dLblPos val="bestFit"/>
+              <c:showLegendKey val="0"/>
+              <c:showVal val="0"/>
+              <c:showCatName val="1"/>
+              <c:showSerName val="0"/>
+              <c:showPercent val="1"/>
+              <c:showBubbleSize val="0"/>
+            </c:dLbl>
+            <c:dLbl>
+              <c:idx val="16"/>
+              <c:spPr/>
+              <c:txPr>
+                <a:bodyPr/>
+                <a:lstStyle/>
+                <a:p>
+                  <a:pPr algn="ctr" rtl="0">
+                    <a:defRPr lang="en-US" sz="1000" b="1" i="0" u="none" strike="noStrike" kern="1200" baseline="0">
+                      <a:solidFill>
+                        <a:schemeClr val="bg1"/>
+                      </a:solidFill>
+                      <a:latin typeface="+mn-lt"/>
+                      <a:ea typeface="+mn-ea"/>
+                      <a:cs typeface="+mn-cs"/>
+                    </a:defRPr>
+                  </a:pPr>
+                  <a:endParaRPr lang="en-US"/>
+                </a:p>
+              </c:txPr>
+              <c:dLblPos val="bestFit"/>
+              <c:showLegendKey val="0"/>
+              <c:showVal val="0"/>
+              <c:showCatName val="1"/>
+              <c:showSerName val="0"/>
+              <c:showPercent val="1"/>
+              <c:showBubbleSize val="0"/>
+            </c:dLbl>
+            <c:dLbl>
+              <c:idx val="17"/>
+              <c:spPr/>
+              <c:txPr>
+                <a:bodyPr/>
+                <a:lstStyle/>
+                <a:p>
+                  <a:pPr algn="ctr" rtl="0">
+                    <a:defRPr lang="en-US" sz="1000" b="1" i="0" u="none" strike="noStrike" kern="1200" baseline="0">
+                      <a:solidFill>
+                        <a:schemeClr val="bg1"/>
+                      </a:solidFill>
+                      <a:latin typeface="+mn-lt"/>
+                      <a:ea typeface="+mn-ea"/>
+                      <a:cs typeface="+mn-cs"/>
+                    </a:defRPr>
+                  </a:pPr>
+                  <a:endParaRPr lang="en-US"/>
+                </a:p>
+              </c:txPr>
+              <c:dLblPos val="bestFit"/>
+              <c:showLegendKey val="0"/>
+              <c:showVal val="0"/>
+              <c:showCatName val="1"/>
+              <c:showSerName val="0"/>
+              <c:showPercent val="1"/>
+              <c:showBubbleSize val="0"/>
+            </c:dLbl>
+            <c:dLbl>
+              <c:idx val="18"/>
+              <c:spPr/>
+              <c:txPr>
+                <a:bodyPr/>
+                <a:lstStyle/>
+                <a:p>
+                  <a:pPr algn="ctr" rtl="0">
+                    <a:defRPr lang="en-US" sz="1000" b="1" i="0" u="none" strike="noStrike" kern="1200" baseline="0">
+                      <a:solidFill>
+                        <a:schemeClr val="bg1"/>
+                      </a:solidFill>
+                      <a:latin typeface="+mn-lt"/>
+                      <a:ea typeface="+mn-ea"/>
+                      <a:cs typeface="+mn-cs"/>
+                    </a:defRPr>
+                  </a:pPr>
+                  <a:endParaRPr lang="en-US"/>
+                </a:p>
+              </c:txPr>
+              <c:dLblPos val="bestFit"/>
+              <c:showLegendKey val="0"/>
+              <c:showVal val="0"/>
+              <c:showCatName val="1"/>
+              <c:showSerName val="0"/>
+              <c:showPercent val="1"/>
+              <c:showBubbleSize val="0"/>
+            </c:dLbl>
             <c:dLblPos val="bestFit"/>
             <c:showLegendKey val="0"/>
             <c:showVal val="0"/>
@@ -470,7 +720,7 @@
           <a:p>
             <a:fld id="{6E7BCF8E-0148-4640-9831-34E5DCA3DA5C}" type="datetimeFigureOut">
               <a:rPr lang="en-US" smtClean="0"/>
-              <a:t>1/13/2014</a:t>
+              <a:t>1/15/2014</a:t>
             </a:fld>
             <a:endParaRPr lang="en-US"/>
           </a:p>
@@ -2459,12 +2709,12 @@
           <a:graphicData uri="http://schemas.openxmlformats.org/presentationml/2006/ole">
             <mc:AlternateContent xmlns:mc="http://schemas.openxmlformats.org/markup-compatibility/2006">
               <mc:Choice xmlns:v="urn:schemas-microsoft-com:vml" Requires="v">
-                <p:oleObj spid="_x0000_s1052" name="Worksheet" r:id="rId3" imgW="3114720" imgH="1095285" progId="Excel.Sheet.12">
+                <p:oleObj spid="_x0000_s1056" name="Worksheet" r:id="rId4" imgW="3114720" imgH="1095285" progId="Excel.Sheet.12">
                   <p:embed/>
                 </p:oleObj>
               </mc:Choice>
               <mc:Fallback>
-                <p:oleObj name="Worksheet" r:id="rId3" imgW="3114720" imgH="1095285" progId="Excel.Sheet.12">
+                <p:oleObj name="Worksheet" r:id="rId4" imgW="3114720" imgH="1095285" progId="Excel.Sheet.12">
                   <p:embed/>
                   <p:pic>
                     <p:nvPicPr>
@@ -2473,7 +2723,7 @@
                       <p:nvPr/>
                     </p:nvPicPr>
                     <p:blipFill>
-                      <a:blip r:embed="rId4"/>
+                      <a:blip r:embed="rId5"/>
                       <a:stretch>
                         <a:fillRect/>
                       </a:stretch>
@@ -3031,7 +3281,15 @@
           <a:p>
             <a:r>
               <a:rPr lang="en-US" dirty="0" smtClean="0"/>
-              <a:t>Not opinionated at all, a smaller library providing structure to architect with.</a:t>
+              <a:t>Not opinionated at all, a smaller </a:t>
+            </a:r>
+            <a:r>
+              <a:rPr lang="en-US" b="1" dirty="0" smtClean="0"/>
+              <a:t>library</a:t>
+            </a:r>
+            <a:r>
+              <a:rPr lang="en-US" dirty="0" smtClean="0"/>
+              <a:t> providing structure to architect with.</a:t>
             </a:r>
           </a:p>
           <a:p>
@@ -3258,7 +3516,15 @@
             </a:r>
             <a:r>
               <a:rPr lang="en-US" dirty="0" smtClean="0"/>
-              <a:t> framework’s move towards JQuery.</a:t>
+              <a:t> </a:t>
+            </a:r>
+            <a:r>
+              <a:rPr lang="en-US" b="1" dirty="0" smtClean="0"/>
+              <a:t>framework</a:t>
+            </a:r>
+            <a:r>
+              <a:rPr lang="en-US" dirty="0" smtClean="0"/>
+              <a:t>’s move towards JQuery.</a:t>
             </a:r>
             <a:endParaRPr lang="en-US" dirty="0"/>
           </a:p>
@@ -3470,7 +3736,15 @@
           <a:p>
             <a:r>
               <a:rPr lang="en-US" dirty="0" smtClean="0"/>
-              <a:t>Considered a MVVM library.</a:t>
+              <a:t>Considered a MVVM </a:t>
+            </a:r>
+            <a:r>
+              <a:rPr lang="en-US" b="1" dirty="0" smtClean="0"/>
+              <a:t>library</a:t>
+            </a:r>
+            <a:r>
+              <a:rPr lang="en-US" dirty="0" smtClean="0"/>
+              <a:t>.</a:t>
             </a:r>
           </a:p>
           <a:p>
@@ -3822,13 +4096,8 @@
           <a:p>
             <a:r>
               <a:rPr lang="en-US" dirty="0" smtClean="0"/>
-              <a:t>The correct choice </a:t>
-            </a:r>
-            <a:r>
-              <a:rPr lang="en-US" dirty="0" smtClean="0"/>
-              <a:t>is dependent on application size and complexity.</a:t>
-            </a:r>
-            <a:endParaRPr lang="en-US" dirty="0" smtClean="0"/>
+              <a:t>The correct choice is dependent on application size and complexity.</a:t>
+            </a:r>
           </a:p>
           <a:p>
             <a:r>
@@ -5171,7 +5440,7 @@
         </p:spPr>
         <p:txBody>
           <a:bodyPr>
-            <a:normAutofit fontScale="55000" lnSpcReduction="20000"/>
+            <a:normAutofit fontScale="85000" lnSpcReduction="10000"/>
           </a:bodyPr>
           <a:lstStyle/>
           <a:p>
@@ -5204,28 +5473,8 @@
           </a:p>
           <a:p>
             <a:r>
-              <a:rPr lang="en-US" dirty="0" smtClean="0"/>
-              <a:t>Introduction to Backbone</a:t>
-            </a:r>
-          </a:p>
-          <a:p>
-            <a:pPr lvl="1"/>
-            <a:r>
-              <a:rPr lang="en-US" dirty="0" smtClean="0"/>
-              <a:t>Using Backbone to structure code.</a:t>
-            </a:r>
-          </a:p>
-          <a:p>
-            <a:r>
-              <a:rPr lang="en-US" dirty="0" smtClean="0"/>
-              <a:t>Modular Development</a:t>
-            </a:r>
-          </a:p>
-          <a:p>
-            <a:pPr lvl="1"/>
-            <a:r>
-              <a:rPr lang="en-US" dirty="0" smtClean="0"/>
-              <a:t>Dividing code into modules and using Backbone routers to move navigation logic to the front end.</a:t>
+              <a:rPr lang="en-US" i="1" dirty="0" smtClean="0"/>
+              <a:t>Before break sessions.</a:t>
             </a:r>
           </a:p>
           <a:p>
@@ -5236,28 +5485,8 @@
           </a:p>
           <a:p>
             <a:r>
-              <a:rPr lang="en-US" dirty="0" smtClean="0"/>
-              <a:t>Interfacing With Back End Services</a:t>
-            </a:r>
-          </a:p>
-          <a:p>
-            <a:pPr lvl="1"/>
-            <a:r>
-              <a:rPr lang="en-US" dirty="0" smtClean="0"/>
-              <a:t>We’ll look at using old and new web services alike.</a:t>
-            </a:r>
-          </a:p>
-          <a:p>
-            <a:r>
-              <a:rPr lang="en-US" dirty="0" smtClean="0"/>
-              <a:t>Intermediate Backbone.</a:t>
-            </a:r>
-          </a:p>
-          <a:p>
-            <a:pPr lvl="1"/>
-            <a:r>
-              <a:rPr lang="en-US" dirty="0" smtClean="0"/>
-              <a:t>Adding validation, mocking and testing.</a:t>
+              <a:rPr lang="en-US" i="1" dirty="0" smtClean="0"/>
+              <a:t>After break sessions.</a:t>
             </a:r>
           </a:p>
           <a:p>
@@ -5757,7 +5986,6 @@
               <a:rPr lang="en-US" sz="2400" dirty="0" smtClean="0"/>
               <a:t>Traditional</a:t>
             </a:r>
-            <a:endParaRPr lang="en-US" sz="2400" dirty="0" smtClean="0"/>
           </a:p>
         </p:txBody>
       </p:sp>
@@ -5786,7 +6014,6 @@
               <a:rPr lang="en-US" sz="2400" dirty="0" smtClean="0"/>
               <a:t>SPA</a:t>
             </a:r>
-            <a:endParaRPr lang="en-US" sz="2400" dirty="0" smtClean="0"/>
           </a:p>
         </p:txBody>
       </p:sp>
@@ -5990,14 +6217,19 @@
             <p:ph idx="1"/>
           </p:nvPr>
         </p:nvSpPr>
-        <p:spPr/>
+        <p:spPr>
+          <a:xfrm>
+            <a:off x="457200" y="1493837"/>
+            <a:ext cx="8229600" cy="4525963"/>
+          </a:xfrm>
+        </p:spPr>
         <p:txBody>
           <a:bodyPr/>
           <a:lstStyle/>
           <a:p>
             <a:r>
               <a:rPr lang="en-US" dirty="0" smtClean="0"/>
-              <a:t>The Major Frameworks/Libraries</a:t>
+              <a:t>Some Major Frameworks/Libraries</a:t>
             </a:r>
           </a:p>
           <a:p>
@@ -6189,7 +6421,7 @@
             <p:ph idx="1"/>
             <p:extLst>
               <p:ext uri="{D42A27DB-BD31-4B8C-83A1-F6EECF244321}">
-                <p14:modId xmlns:p14="http://schemas.microsoft.com/office/powerpoint/2010/main" val="1112044391"/>
+                <p14:modId xmlns:p14="http://schemas.microsoft.com/office/powerpoint/2010/main" val="1104780721"/>
               </p:ext>
             </p:extLst>
           </p:nvPr>

</xml_diff>

<commit_message>
update the script and slides. Script is first completed draft
</commit_message>
<xml_diff>
--- a/presentation/SPA_workshop.pptx
+++ b/presentation/SPA_workshop.pptx
@@ -131,7 +131,7 @@
   </p:defaultTextStyle>
   <p:extLst>
     <p:ext uri="{EFAFB233-063F-42B5-8137-9DF3F51BA10A}">
-      <p15:sldGuideLst xmlns:p15="http://schemas.microsoft.com/office/powerpoint/2012/main">
+      <p15:sldGuideLst xmlns:p15="http://schemas.microsoft.com/office/powerpoint/2012/main" xmlns="">
         <p15:guide id="1" orient="horz" pos="2832">
           <p15:clr>
             <a:srgbClr val="A4A3A4"/>
@@ -145,7 +145,7 @@
       </p15:sldGuideLst>
     </p:ext>
     <p:ext uri="{2D200454-40CA-4A62-9FC3-DE9A4176ACB9}">
-      <p15:notesGuideLst xmlns:p15="http://schemas.microsoft.com/office/powerpoint/2012/main">
+      <p15:notesGuideLst xmlns:p15="http://schemas.microsoft.com/office/powerpoint/2012/main" xmlns="">
         <p15:guide id="1" orient="horz" pos="2928">
           <p15:clr>
             <a:srgbClr val="A4A3A4"/>
@@ -197,6 +197,7 @@
           </a:p>
         </c:rich>
       </c:tx>
+      <c:layout/>
       <c:overlay val="0"/>
     </c:title>
     <c:autoTitleDeleted val="0"/>
@@ -210,6 +211,7 @@
           <c:dLbls>
             <c:dLbl>
               <c:idx val="1"/>
+              <c:layout/>
               <c:tx>
                 <c:rich>
                   <a:bodyPr/>
@@ -248,6 +250,7 @@
             </c:dLbl>
             <c:dLbl>
               <c:idx val="2"/>
+              <c:layout/>
               <c:tx>
                 <c:rich>
                   <a:bodyPr/>
@@ -292,6 +295,7 @@
             </c:dLbl>
             <c:dLbl>
               <c:idx val="6"/>
+              <c:layout/>
               <c:tx>
                 <c:rich>
                   <a:bodyPr/>
@@ -765,7 +769,7 @@
           <a:p>
             <a:fld id="{6E7BCF8E-0148-4640-9831-34E5DCA3DA5C}" type="datetimeFigureOut">
               <a:rPr lang="en-US" smtClean="0"/>
-              <a:t>1/16/2014</a:t>
+              <a:t>1/17/2014</a:t>
             </a:fld>
             <a:endParaRPr lang="en-US"/>
           </a:p>
@@ -2754,12 +2758,12 @@
           <a:graphicData uri="http://schemas.openxmlformats.org/presentationml/2006/ole">
             <mc:AlternateContent xmlns:mc="http://schemas.openxmlformats.org/markup-compatibility/2006">
               <mc:Choice xmlns:v="urn:schemas-microsoft-com:vml" Requires="v">
-                <p:oleObj spid="_x0000_s1058" name="Worksheet" r:id="rId3" imgW="3114720" imgH="1095285" progId="Excel.Sheet.12">
+                <p:oleObj spid="_x0000_s1059" name="Worksheet" r:id="rId4" imgW="3114720" imgH="1095285" progId="Excel.Sheet.12">
                   <p:embed/>
                 </p:oleObj>
               </mc:Choice>
               <mc:Fallback>
-                <p:oleObj name="Worksheet" r:id="rId3" imgW="3114720" imgH="1095285" progId="Excel.Sheet.12">
+                <p:oleObj name="Worksheet" r:id="rId4" imgW="3114720" imgH="1095285" progId="Excel.Sheet.12">
                   <p:embed/>
                   <p:pic>
                     <p:nvPicPr>
@@ -2768,7 +2772,7 @@
                       <p:nvPr/>
                     </p:nvPicPr>
                     <p:blipFill>
-                      <a:blip r:embed="rId4"/>
+                      <a:blip r:embed="rId5"/>
                       <a:stretch>
                         <a:fillRect/>
                       </a:stretch>

</xml_diff>